<commit_message>
[2022/06/08 20:59:58] comments: update
</commit_message>
<xml_diff>
--- a/2022-1（UE4材质编辑）.pptx
+++ b/2022-1（UE4材质编辑）.pptx
@@ -269,7 +269,7 @@
           <a:p>
             <a:fld id="{C1AFDE93-949C-47ED-A631-476E40CF0087}" type="datetimeFigureOut">
               <a:rPr lang="zh-CN" altLang="en-US" smtClean="0"/>
-              <a:t>2022/6/6</a:t>
+              <a:t>2022/6/8</a:t>
             </a:fld>
             <a:endParaRPr lang="zh-CN" altLang="en-US"/>
           </a:p>
@@ -1210,7 +1210,7 @@
           <a:p>
             <a:fld id="{F06A2785-4E77-4690-870F-283ACAAC6AF9}" type="datetimeFigureOut">
               <a:rPr lang="zh-CN" altLang="en-US" smtClean="0"/>
-              <a:t>2022/6/6</a:t>
+              <a:t>2022/6/8</a:t>
             </a:fld>
             <a:endParaRPr lang="zh-CN" altLang="en-US"/>
           </a:p>
@@ -1408,7 +1408,7 @@
           <a:p>
             <a:fld id="{F06A2785-4E77-4690-870F-283ACAAC6AF9}" type="datetimeFigureOut">
               <a:rPr lang="zh-CN" altLang="en-US" smtClean="0"/>
-              <a:t>2022/6/6</a:t>
+              <a:t>2022/6/8</a:t>
             </a:fld>
             <a:endParaRPr lang="zh-CN" altLang="en-US"/>
           </a:p>
@@ -1616,7 +1616,7 @@
           <a:p>
             <a:fld id="{F06A2785-4E77-4690-870F-283ACAAC6AF9}" type="datetimeFigureOut">
               <a:rPr lang="zh-CN" altLang="en-US" smtClean="0"/>
-              <a:t>2022/6/6</a:t>
+              <a:t>2022/6/8</a:t>
             </a:fld>
             <a:endParaRPr lang="zh-CN" altLang="en-US"/>
           </a:p>
@@ -1814,7 +1814,7 @@
           <a:p>
             <a:fld id="{F06A2785-4E77-4690-870F-283ACAAC6AF9}" type="datetimeFigureOut">
               <a:rPr lang="zh-CN" altLang="en-US" smtClean="0"/>
-              <a:t>2022/6/6</a:t>
+              <a:t>2022/6/8</a:t>
             </a:fld>
             <a:endParaRPr lang="zh-CN" altLang="en-US"/>
           </a:p>
@@ -2089,7 +2089,7 @@
           <a:p>
             <a:fld id="{F06A2785-4E77-4690-870F-283ACAAC6AF9}" type="datetimeFigureOut">
               <a:rPr lang="zh-CN" altLang="en-US" smtClean="0"/>
-              <a:t>2022/6/6</a:t>
+              <a:t>2022/6/8</a:t>
             </a:fld>
             <a:endParaRPr lang="zh-CN" altLang="en-US"/>
           </a:p>
@@ -2354,7 +2354,7 @@
           <a:p>
             <a:fld id="{F06A2785-4E77-4690-870F-283ACAAC6AF9}" type="datetimeFigureOut">
               <a:rPr lang="zh-CN" altLang="en-US" smtClean="0"/>
-              <a:t>2022/6/6</a:t>
+              <a:t>2022/6/8</a:t>
             </a:fld>
             <a:endParaRPr lang="zh-CN" altLang="en-US"/>
           </a:p>
@@ -2766,7 +2766,7 @@
           <a:p>
             <a:fld id="{F06A2785-4E77-4690-870F-283ACAAC6AF9}" type="datetimeFigureOut">
               <a:rPr lang="zh-CN" altLang="en-US" smtClean="0"/>
-              <a:t>2022/6/6</a:t>
+              <a:t>2022/6/8</a:t>
             </a:fld>
             <a:endParaRPr lang="zh-CN" altLang="en-US"/>
           </a:p>
@@ -2907,7 +2907,7 @@
           <a:p>
             <a:fld id="{F06A2785-4E77-4690-870F-283ACAAC6AF9}" type="datetimeFigureOut">
               <a:rPr lang="zh-CN" altLang="en-US" smtClean="0"/>
-              <a:t>2022/6/6</a:t>
+              <a:t>2022/6/8</a:t>
             </a:fld>
             <a:endParaRPr lang="zh-CN" altLang="en-US"/>
           </a:p>
@@ -3020,7 +3020,7 @@
           <a:p>
             <a:fld id="{F06A2785-4E77-4690-870F-283ACAAC6AF9}" type="datetimeFigureOut">
               <a:rPr lang="zh-CN" altLang="en-US" smtClean="0"/>
-              <a:t>2022/6/6</a:t>
+              <a:t>2022/6/8</a:t>
             </a:fld>
             <a:endParaRPr lang="zh-CN" altLang="en-US"/>
           </a:p>
@@ -3331,7 +3331,7 @@
           <a:p>
             <a:fld id="{F06A2785-4E77-4690-870F-283ACAAC6AF9}" type="datetimeFigureOut">
               <a:rPr lang="zh-CN" altLang="en-US" smtClean="0"/>
-              <a:t>2022/6/6</a:t>
+              <a:t>2022/6/8</a:t>
             </a:fld>
             <a:endParaRPr lang="zh-CN" altLang="en-US"/>
           </a:p>
@@ -3619,7 +3619,7 @@
           <a:p>
             <a:fld id="{F06A2785-4E77-4690-870F-283ACAAC6AF9}" type="datetimeFigureOut">
               <a:rPr lang="zh-CN" altLang="en-US" smtClean="0"/>
-              <a:t>2022/6/6</a:t>
+              <a:t>2022/6/8</a:t>
             </a:fld>
             <a:endParaRPr lang="zh-CN" altLang="en-US"/>
           </a:p>
@@ -3860,7 +3860,7 @@
           <a:p>
             <a:fld id="{F06A2785-4E77-4690-870F-283ACAAC6AF9}" type="datetimeFigureOut">
               <a:rPr lang="zh-CN" altLang="en-US" smtClean="0"/>
-              <a:t>2022/6/6</a:t>
+              <a:t>2022/6/8</a:t>
             </a:fld>
             <a:endParaRPr lang="zh-CN" altLang="en-US"/>
           </a:p>
@@ -4291,292 +4291,6 @@
           <a:chExt cx="0" cy="0"/>
         </a:xfrm>
       </p:grpSpPr>
-      <p:grpSp>
-        <p:nvGrpSpPr>
-          <p:cNvPr id="7" name="组合 6" hidden="1">
-            <a:extLst>
-              <a:ext uri="{FF2B5EF4-FFF2-40B4-BE49-F238E27FC236}">
-                <a16:creationId xmlns:a16="http://schemas.microsoft.com/office/drawing/2014/main" id="{4CA1E171-F9FA-6981-1628-4B30591A3EFB}"/>
-              </a:ext>
-            </a:extLst>
-          </p:cNvPr>
-          <p:cNvGrpSpPr/>
-          <p:nvPr/>
-        </p:nvGrpSpPr>
-        <p:grpSpPr>
-          <a:xfrm>
-            <a:off x="-8881530" y="0"/>
-            <a:ext cx="11459348" cy="6859534"/>
-            <a:chOff x="-1543570" y="-1534"/>
-            <a:chExt cx="11459348" cy="6859534"/>
-          </a:xfrm>
-        </p:grpSpPr>
-        <p:sp>
-          <p:nvSpPr>
-            <p:cNvPr id="8" name="文本框 7">
-              <a:extLst>
-                <a:ext uri="{FF2B5EF4-FFF2-40B4-BE49-F238E27FC236}">
-                  <a16:creationId xmlns:a16="http://schemas.microsoft.com/office/drawing/2014/main" id="{17593F07-218D-3B51-5FFF-2B3BD3B4E754}"/>
-                </a:ext>
-              </a:extLst>
-            </p:cNvPr>
-            <p:cNvSpPr txBox="1"/>
-            <p:nvPr/>
-          </p:nvSpPr>
-          <p:spPr>
-            <a:xfrm>
-              <a:off x="9107178" y="1901334"/>
-              <a:ext cx="808600" cy="888651"/>
-            </a:xfrm>
-            <a:prstGeom prst="flowChartAlternateProcess">
-              <a:avLst/>
-            </a:prstGeom>
-            <a:solidFill>
-              <a:schemeClr val="bg2">
-                <a:lumMod val="75000"/>
-              </a:schemeClr>
-            </a:solidFill>
-            <a:ln>
-              <a:noFill/>
-            </a:ln>
-            <a:effectLst>
-              <a:outerShdw blurRad="50800" dist="38100" algn="l" rotWithShape="0">
-                <a:prstClr val="black">
-                  <a:alpha val="40000"/>
-                </a:prstClr>
-              </a:outerShdw>
-              <a:softEdge rad="0"/>
-            </a:effectLst>
-          </p:spPr>
-          <p:style>
-            <a:lnRef idx="3">
-              <a:schemeClr val="lt1"/>
-            </a:lnRef>
-            <a:fillRef idx="1">
-              <a:schemeClr val="accent1"/>
-            </a:fillRef>
-            <a:effectRef idx="1">
-              <a:schemeClr val="accent1"/>
-            </a:effectRef>
-            <a:fontRef idx="minor">
-              <a:schemeClr val="lt1"/>
-            </a:fontRef>
-          </p:style>
-          <p:txBody>
-            <a:bodyPr wrap="square" rtlCol="0" anchor="ctr" anchorCtr="0">
-              <a:noAutofit/>
-            </a:bodyPr>
-            <a:lstStyle/>
-            <a:p>
-              <a:pPr algn="ctr"/>
-              <a:r>
-                <a:rPr lang="en-US" altLang="zh-CN" sz="3200" b="1" dirty="0">
-                  <a:latin typeface="Bauhaus 93" panose="04030905020B02020C02" pitchFamily="82" charset="0"/>
-                </a:rPr>
-                <a:t>2</a:t>
-              </a:r>
-              <a:endParaRPr lang="zh-CN" altLang="en-US" sz="3200" b="1" dirty="0">
-                <a:latin typeface="Bauhaus 93" panose="04030905020B02020C02" pitchFamily="82" charset="0"/>
-              </a:endParaRPr>
-            </a:p>
-          </p:txBody>
-        </p:sp>
-        <p:sp>
-          <p:nvSpPr>
-            <p:cNvPr id="9" name="矩形 8">
-              <a:extLst>
-                <a:ext uri="{FF2B5EF4-FFF2-40B4-BE49-F238E27FC236}">
-                  <a16:creationId xmlns:a16="http://schemas.microsoft.com/office/drawing/2014/main" id="{4BD5810B-3011-6E5A-C575-0D87EA7B47E1}"/>
-                </a:ext>
-              </a:extLst>
-            </p:cNvPr>
-            <p:cNvSpPr/>
-            <p:nvPr/>
-          </p:nvSpPr>
-          <p:spPr>
-            <a:xfrm>
-              <a:off x="-1543570" y="-1534"/>
-              <a:ext cx="10804172" cy="6859534"/>
-            </a:xfrm>
-            <a:prstGeom prst="rect">
-              <a:avLst/>
-            </a:prstGeom>
-            <a:solidFill>
-              <a:schemeClr val="bg2">
-                <a:lumMod val="75000"/>
-              </a:schemeClr>
-            </a:solidFill>
-            <a:ln>
-              <a:noFill/>
-            </a:ln>
-          </p:spPr>
-          <p:style>
-            <a:lnRef idx="2">
-              <a:schemeClr val="accent1">
-                <a:shade val="50000"/>
-              </a:schemeClr>
-            </a:lnRef>
-            <a:fillRef idx="1">
-              <a:schemeClr val="accent1"/>
-            </a:fillRef>
-            <a:effectRef idx="0">
-              <a:schemeClr val="accent1"/>
-            </a:effectRef>
-            <a:fontRef idx="minor">
-              <a:schemeClr val="lt1"/>
-            </a:fontRef>
-          </p:style>
-          <p:txBody>
-            <a:bodyPr rtlCol="0" anchor="ctr"/>
-            <a:lstStyle/>
-            <a:p>
-              <a:pPr algn="ctr"/>
-              <a:endParaRPr lang="zh-CN" altLang="en-US" dirty="0"/>
-            </a:p>
-          </p:txBody>
-        </p:sp>
-      </p:grpSp>
-      <p:grpSp>
-        <p:nvGrpSpPr>
-          <p:cNvPr id="12" name="组合 11" hidden="1">
-            <a:extLst>
-              <a:ext uri="{FF2B5EF4-FFF2-40B4-BE49-F238E27FC236}">
-                <a16:creationId xmlns:a16="http://schemas.microsoft.com/office/drawing/2014/main" id="{B2951025-4466-F7EF-45C6-A3CB7EF1CC66}"/>
-              </a:ext>
-            </a:extLst>
-          </p:cNvPr>
-          <p:cNvGrpSpPr/>
-          <p:nvPr/>
-        </p:nvGrpSpPr>
-        <p:grpSpPr>
-          <a:xfrm>
-            <a:off x="-9685865" y="0"/>
-            <a:ext cx="11459348" cy="6859534"/>
-            <a:chOff x="-1543570" y="-1534"/>
-            <a:chExt cx="11459348" cy="6859534"/>
-          </a:xfrm>
-        </p:grpSpPr>
-        <p:sp>
-          <p:nvSpPr>
-            <p:cNvPr id="13" name="文本框 12">
-              <a:extLst>
-                <a:ext uri="{FF2B5EF4-FFF2-40B4-BE49-F238E27FC236}">
-                  <a16:creationId xmlns:a16="http://schemas.microsoft.com/office/drawing/2014/main" id="{639F4C49-2D9D-548F-092F-5A740BB0FB64}"/>
-                </a:ext>
-              </a:extLst>
-            </p:cNvPr>
-            <p:cNvSpPr txBox="1"/>
-            <p:nvPr/>
-          </p:nvSpPr>
-          <p:spPr>
-            <a:xfrm>
-              <a:off x="9107178" y="2587131"/>
-              <a:ext cx="808600" cy="888651"/>
-            </a:xfrm>
-            <a:prstGeom prst="flowChartAlternateProcess">
-              <a:avLst/>
-            </a:prstGeom>
-            <a:solidFill>
-              <a:srgbClr val="4E607A"/>
-            </a:solidFill>
-            <a:ln>
-              <a:noFill/>
-            </a:ln>
-            <a:effectLst>
-              <a:outerShdw blurRad="50800" dist="38100" algn="l" rotWithShape="0">
-                <a:prstClr val="black">
-                  <a:alpha val="40000"/>
-                </a:prstClr>
-              </a:outerShdw>
-              <a:softEdge rad="0"/>
-            </a:effectLst>
-          </p:spPr>
-          <p:style>
-            <a:lnRef idx="3">
-              <a:schemeClr val="lt1"/>
-            </a:lnRef>
-            <a:fillRef idx="1">
-              <a:schemeClr val="accent1"/>
-            </a:fillRef>
-            <a:effectRef idx="1">
-              <a:schemeClr val="accent1"/>
-            </a:effectRef>
-            <a:fontRef idx="minor">
-              <a:schemeClr val="lt1"/>
-            </a:fontRef>
-          </p:style>
-          <p:txBody>
-            <a:bodyPr wrap="square" rtlCol="0" anchor="ctr" anchorCtr="0">
-              <a:noAutofit/>
-            </a:bodyPr>
-            <a:lstStyle/>
-            <a:p>
-              <a:pPr algn="ctr"/>
-              <a:r>
-                <a:rPr lang="en-US" altLang="zh-CN" sz="3200" b="1" dirty="0">
-                  <a:latin typeface="Bauhaus 93" panose="04030905020B02020C02" pitchFamily="82" charset="0"/>
-                </a:rPr>
-                <a:t>3</a:t>
-              </a:r>
-              <a:endParaRPr lang="zh-CN" altLang="en-US" sz="3200" b="1" dirty="0">
-                <a:latin typeface="Bauhaus 93" panose="04030905020B02020C02" pitchFamily="82" charset="0"/>
-              </a:endParaRPr>
-            </a:p>
-          </p:txBody>
-        </p:sp>
-        <p:sp>
-          <p:nvSpPr>
-            <p:cNvPr id="14" name="矩形 13">
-              <a:extLst>
-                <a:ext uri="{FF2B5EF4-FFF2-40B4-BE49-F238E27FC236}">
-                  <a16:creationId xmlns:a16="http://schemas.microsoft.com/office/drawing/2014/main" id="{AE00B959-9713-4F96-2D07-989385768095}"/>
-                </a:ext>
-              </a:extLst>
-            </p:cNvPr>
-            <p:cNvSpPr/>
-            <p:nvPr/>
-          </p:nvSpPr>
-          <p:spPr>
-            <a:xfrm>
-              <a:off x="-1543570" y="-1534"/>
-              <a:ext cx="10804172" cy="6859534"/>
-            </a:xfrm>
-            <a:prstGeom prst="rect">
-              <a:avLst/>
-            </a:prstGeom>
-            <a:solidFill>
-              <a:srgbClr val="4E607A"/>
-            </a:solidFill>
-            <a:ln>
-              <a:noFill/>
-            </a:ln>
-          </p:spPr>
-          <p:style>
-            <a:lnRef idx="2">
-              <a:schemeClr val="accent1">
-                <a:shade val="50000"/>
-              </a:schemeClr>
-            </a:lnRef>
-            <a:fillRef idx="1">
-              <a:schemeClr val="accent1"/>
-            </a:fillRef>
-            <a:effectRef idx="0">
-              <a:schemeClr val="accent1"/>
-            </a:effectRef>
-            <a:fontRef idx="minor">
-              <a:schemeClr val="lt1"/>
-            </a:fontRef>
-          </p:style>
-          <p:txBody>
-            <a:bodyPr rtlCol="0" anchor="ctr"/>
-            <a:lstStyle/>
-            <a:p>
-              <a:pPr algn="ctr"/>
-              <a:endParaRPr lang="zh-CN" altLang="en-US" dirty="0"/>
-            </a:p>
-          </p:txBody>
-        </p:sp>
-      </p:grpSp>
       <p:pic>
         <p:nvPicPr>
           <p:cNvPr id="30" name="图片 29">
@@ -4936,94 +4650,14 @@
                                 </p:stCondLst>
                                 <p:childTnLst>
                                   <p:par>
-                                    <p:cTn id="5" presetID="63" presetClass="path" presetSubtype="0" accel="50000" fill="hold" nodeType="clickEffect" p14:presetBounceEnd="51000">
-                                      <p:stCondLst>
-                                        <p:cond delay="0"/>
-                                      </p:stCondLst>
-                                      <p:childTnLst>
-                                        <p:animMotion origin="layout" path="M -8.33333E-7 0 L 0.67448 0 " pathEditMode="relative" rAng="0" ptsTypes="AA" p14:bounceEnd="51000">
-                                          <p:cBhvr>
-                                            <p:cTn id="6" dur="1000" fill="hold"/>
-                                            <p:tgtEl>
-                                              <p:spTgt spid="12"/>
-                                            </p:tgtEl>
-                                            <p:attrNameLst>
-                                              <p:attrName>ppt_x</p:attrName>
-                                              <p:attrName>ppt_y</p:attrName>
-                                            </p:attrNameLst>
-                                          </p:cBhvr>
-                                          <p:rCtr x="33724" y="0"/>
-                                        </p:animMotion>
-                                      </p:childTnLst>
-                                    </p:cTn>
-                                  </p:par>
-                                </p:childTnLst>
-                              </p:cTn>
-                            </p:par>
-                          </p:childTnLst>
-                        </p:cTn>
-                      </p:par>
-                      <p:par>
-                        <p:cTn id="7" fill="hold">
-                          <p:stCondLst>
-                            <p:cond delay="indefinite"/>
-                          </p:stCondLst>
-                          <p:childTnLst>
-                            <p:par>
-                              <p:cTn id="8" fill="hold">
-                                <p:stCondLst>
-                                  <p:cond delay="0"/>
-                                </p:stCondLst>
-                                <p:childTnLst>
-                                  <p:par>
-                                    <p:cTn id="9" presetID="63" presetClass="path" presetSubtype="0" accel="50000" fill="hold" nodeType="clickEffect" p14:presetBounceEnd="51000">
-                                      <p:stCondLst>
-                                        <p:cond delay="0"/>
-                                      </p:stCondLst>
-                                      <p:childTnLst>
-                                        <p:animMotion origin="layout" path="M 3.54167E-6 0 L 0.67448 0 " pathEditMode="relative" rAng="0" ptsTypes="AA" p14:bounceEnd="51000">
-                                          <p:cBhvr>
-                                            <p:cTn id="10" dur="1000" fill="hold"/>
-                                            <p:tgtEl>
-                                              <p:spTgt spid="7"/>
-                                            </p:tgtEl>
-                                            <p:attrNameLst>
-                                              <p:attrName>ppt_x</p:attrName>
-                                              <p:attrName>ppt_y</p:attrName>
-                                            </p:attrNameLst>
-                                          </p:cBhvr>
-                                          <p:rCtr x="33724" y="0"/>
-                                        </p:animMotion>
-                                      </p:childTnLst>
-                                    </p:cTn>
-                                  </p:par>
-                                </p:childTnLst>
-                              </p:cTn>
-                            </p:par>
-                          </p:childTnLst>
-                        </p:cTn>
-                      </p:par>
-                      <p:par>
-                        <p:cTn id="11" fill="hold">
-                          <p:stCondLst>
-                            <p:cond delay="indefinite"/>
-                          </p:stCondLst>
-                          <p:childTnLst>
-                            <p:par>
-                              <p:cTn id="12" fill="hold">
-                                <p:stCondLst>
-                                  <p:cond delay="0"/>
-                                </p:stCondLst>
-                                <p:childTnLst>
-                                  <p:par>
-                                    <p:cTn id="13" presetID="10" presetClass="entr" presetSubtype="0" fill="hold" nodeType="clickEffect">
+                                    <p:cTn id="5" presetID="10" presetClass="entr" presetSubtype="0" fill="hold" nodeType="clickEffect">
                                       <p:stCondLst>
                                         <p:cond delay="0"/>
                                       </p:stCondLst>
                                       <p:childTnLst>
                                         <p:set>
                                           <p:cBhvr>
-                                            <p:cTn id="14" dur="1" fill="hold">
+                                            <p:cTn id="6" dur="1" fill="hold">
                                               <p:stCondLst>
                                                 <p:cond delay="0"/>
                                               </p:stCondLst>
@@ -5041,7 +4675,7 @@
                                         </p:set>
                                         <p:animEffect transition="in" filter="fade">
                                           <p:cBhvr>
-                                            <p:cTn id="15" dur="500"/>
+                                            <p:cTn id="7" dur="500"/>
                                             <p:tgtEl>
                                               <p:spTgt spid="31"/>
                                             </p:tgtEl>
@@ -5051,14 +4685,14 @@
                                     </p:cTn>
                                   </p:par>
                                   <p:par>
-                                    <p:cTn id="16" presetID="14" presetClass="exit" presetSubtype="10" fill="hold" nodeType="withEffect">
+                                    <p:cTn id="8" presetID="14" presetClass="exit" presetSubtype="10" fill="hold" nodeType="withEffect">
                                       <p:stCondLst>
                                         <p:cond delay="0"/>
                                       </p:stCondLst>
                                       <p:childTnLst>
                                         <p:animEffect transition="out" filter="randombar(horizontal)">
                                           <p:cBhvr>
-                                            <p:cTn id="17" dur="500"/>
+                                            <p:cTn id="9" dur="500"/>
                                             <p:tgtEl>
                                               <p:spTgt spid="30"/>
                                             </p:tgtEl>
@@ -5066,7 +4700,7 @@
                                         </p:animEffect>
                                         <p:set>
                                           <p:cBhvr>
-                                            <p:cTn id="18" dur="1" fill="hold">
+                                            <p:cTn id="10" dur="1" fill="hold">
                                               <p:stCondLst>
                                                 <p:cond delay="499"/>
                                               </p:stCondLst>
@@ -5089,20 +4723,20 @@
                               </p:cTn>
                             </p:par>
                             <p:par>
-                              <p:cTn id="19" fill="hold">
+                              <p:cTn id="11" fill="hold">
                                 <p:stCondLst>
                                   <p:cond delay="500"/>
                                 </p:stCondLst>
                                 <p:childTnLst>
                                   <p:par>
-                                    <p:cTn id="20" presetID="6" presetClass="entr" presetSubtype="16" fill="hold" nodeType="afterEffect">
+                                    <p:cTn id="12" presetID="6" presetClass="entr" presetSubtype="16" fill="hold" nodeType="afterEffect">
                                       <p:stCondLst>
                                         <p:cond delay="0"/>
                                       </p:stCondLst>
                                       <p:childTnLst>
                                         <p:set>
                                           <p:cBhvr>
-                                            <p:cTn id="21" dur="1" fill="hold">
+                                            <p:cTn id="13" dur="1" fill="hold">
                                               <p:stCondLst>
                                                 <p:cond delay="0"/>
                                               </p:stCondLst>
@@ -5120,7 +4754,7 @@
                                         </p:set>
                                         <p:animEffect transition="in" filter="circle(in)">
                                           <p:cBhvr>
-                                            <p:cTn id="22" dur="1000"/>
+                                            <p:cTn id="14" dur="1000"/>
                                             <p:tgtEl>
                                               <p:spTgt spid="33"/>
                                             </p:tgtEl>
@@ -5133,20 +4767,20 @@
                               </p:cTn>
                             </p:par>
                             <p:par>
-                              <p:cTn id="23" fill="hold">
+                              <p:cTn id="15" fill="hold">
                                 <p:stCondLst>
                                   <p:cond delay="1500"/>
                                 </p:stCondLst>
                                 <p:childTnLst>
                                   <p:par>
-                                    <p:cTn id="24" presetID="16" presetClass="entr" presetSubtype="21" fill="hold" grpId="0" nodeType="afterEffect">
+                                    <p:cTn id="16" presetID="16" presetClass="entr" presetSubtype="21" fill="hold" grpId="0" nodeType="afterEffect">
                                       <p:stCondLst>
                                         <p:cond delay="0"/>
                                       </p:stCondLst>
                                       <p:childTnLst>
                                         <p:set>
                                           <p:cBhvr>
-                                            <p:cTn id="25" dur="1" fill="hold">
+                                            <p:cTn id="17" dur="1" fill="hold">
                                               <p:stCondLst>
                                                 <p:cond delay="0"/>
                                               </p:stCondLst>
@@ -5164,7 +4798,7 @@
                                         </p:set>
                                         <p:animEffect transition="in" filter="barn(inVertical)">
                                           <p:cBhvr>
-                                            <p:cTn id="26" dur="500"/>
+                                            <p:cTn id="18" dur="500"/>
                                             <p:tgtEl>
                                               <p:spTgt spid="34"/>
                                             </p:tgtEl>
@@ -5177,20 +4811,20 @@
                               </p:cTn>
                             </p:par>
                             <p:par>
-                              <p:cTn id="27" fill="hold">
+                              <p:cTn id="19" fill="hold">
                                 <p:stCondLst>
                                   <p:cond delay="2000"/>
                                 </p:stCondLst>
                                 <p:childTnLst>
                                   <p:par>
-                                    <p:cTn id="28" presetID="16" presetClass="entr" presetSubtype="21" fill="hold" grpId="0" nodeType="afterEffect">
+                                    <p:cTn id="20" presetID="16" presetClass="entr" presetSubtype="21" fill="hold" grpId="0" nodeType="afterEffect">
                                       <p:stCondLst>
                                         <p:cond delay="0"/>
                                       </p:stCondLst>
                                       <p:childTnLst>
                                         <p:set>
                                           <p:cBhvr>
-                                            <p:cTn id="29" dur="1" fill="hold">
+                                            <p:cTn id="21" dur="1" fill="hold">
                                               <p:stCondLst>
                                                 <p:cond delay="0"/>
                                               </p:stCondLst>
@@ -5208,7 +4842,7 @@
                                         </p:set>
                                         <p:animEffect transition="in" filter="barn(inVertical)">
                                           <p:cBhvr>
-                                            <p:cTn id="30" dur="500"/>
+                                            <p:cTn id="22" dur="500"/>
                                             <p:tgtEl>
                                               <p:spTgt spid="35"/>
                                             </p:tgtEl>
@@ -5221,20 +4855,20 @@
                               </p:cTn>
                             </p:par>
                             <p:par>
-                              <p:cTn id="31" fill="hold">
+                              <p:cTn id="23" fill="hold">
                                 <p:stCondLst>
                                   <p:cond delay="2500"/>
                                 </p:stCondLst>
                                 <p:childTnLst>
                                   <p:par>
-                                    <p:cTn id="32" presetID="16" presetClass="entr" presetSubtype="21" fill="hold" grpId="0" nodeType="afterEffect">
+                                    <p:cTn id="24" presetID="16" presetClass="entr" presetSubtype="21" fill="hold" grpId="0" nodeType="afterEffect">
                                       <p:stCondLst>
                                         <p:cond delay="0"/>
                                       </p:stCondLst>
                                       <p:childTnLst>
                                         <p:set>
                                           <p:cBhvr>
-                                            <p:cTn id="33" dur="1" fill="hold">
+                                            <p:cTn id="25" dur="1" fill="hold">
                                               <p:stCondLst>
                                                 <p:cond delay="0"/>
                                               </p:stCondLst>
@@ -5252,7 +4886,7 @@
                                         </p:set>
                                         <p:animEffect transition="in" filter="barn(inVertical)">
                                           <p:cBhvr>
-                                            <p:cTn id="34" dur="500"/>
+                                            <p:cTn id="26" dur="500"/>
                                             <p:tgtEl>
                                               <p:spTgt spid="36"/>
                                             </p:tgtEl>
@@ -9367,7 +9001,7 @@
         </p:nvGrpSpPr>
         <p:grpSpPr>
           <a:xfrm>
-            <a:off x="-8771984" y="3934"/>
+            <a:off x="-8777121" y="3934"/>
             <a:ext cx="11459348" cy="6859534"/>
             <a:chOff x="-1543570" y="-1534"/>
             <a:chExt cx="11459348" cy="6859534"/>
@@ -9512,7 +9146,7 @@
         </p:nvGrpSpPr>
         <p:grpSpPr>
           <a:xfrm>
-            <a:off x="-8239248" y="28400"/>
+            <a:off x="654690" y="28400"/>
             <a:ext cx="9588109" cy="6801200"/>
             <a:chOff x="571891" y="28400"/>
             <a:chExt cx="9588109" cy="6801200"/>
@@ -9837,7 +9471,7 @@
       </p:grpSp>
       <p:grpSp>
         <p:nvGrpSpPr>
-          <p:cNvPr id="12" name="组合 11">
+          <p:cNvPr id="12" name="组合 11" hidden="1">
             <a:extLst>
               <a:ext uri="{FF2B5EF4-FFF2-40B4-BE49-F238E27FC236}">
                 <a16:creationId xmlns:a16="http://schemas.microsoft.com/office/drawing/2014/main" id="{B2951025-4466-F7EF-45C6-A3CB7EF1CC66}"/>
@@ -9978,7 +9612,7 @@
       </p:grpSp>
       <p:grpSp>
         <p:nvGrpSpPr>
-          <p:cNvPr id="18" name="组合 17">
+          <p:cNvPr id="18" name="组合 17" hidden="1">
             <a:extLst>
               <a:ext uri="{FF2B5EF4-FFF2-40B4-BE49-F238E27FC236}">
                 <a16:creationId xmlns:a16="http://schemas.microsoft.com/office/drawing/2014/main" id="{7F6BD44A-0418-7275-D2E9-F6673D940EE8}"/>
@@ -10375,6 +10009,219 @@
           </p:txBody>
         </p:sp>
       </p:grpSp>
+      <p:grpSp>
+        <p:nvGrpSpPr>
+          <p:cNvPr id="11" name="组合 10">
+            <a:extLst>
+              <a:ext uri="{FF2B5EF4-FFF2-40B4-BE49-F238E27FC236}">
+                <a16:creationId xmlns:a16="http://schemas.microsoft.com/office/drawing/2014/main" id="{5C0017F4-1DF7-45E4-E925-F9E8846432D3}"/>
+              </a:ext>
+            </a:extLst>
+          </p:cNvPr>
+          <p:cNvGrpSpPr/>
+          <p:nvPr/>
+        </p:nvGrpSpPr>
+        <p:grpSpPr>
+          <a:xfrm>
+            <a:off x="-5904813" y="869431"/>
+            <a:ext cx="6273314" cy="5125926"/>
+            <a:chOff x="-6564329" y="849088"/>
+            <a:chExt cx="6273314" cy="5125926"/>
+          </a:xfrm>
+        </p:grpSpPr>
+        <p:pic>
+          <p:nvPicPr>
+            <p:cNvPr id="3" name="图片 2">
+              <a:extLst>
+                <a:ext uri="{FF2B5EF4-FFF2-40B4-BE49-F238E27FC236}">
+                  <a16:creationId xmlns:a16="http://schemas.microsoft.com/office/drawing/2014/main" id="{E315156A-5361-98F9-F099-68B655C511EF}"/>
+                </a:ext>
+              </a:extLst>
+            </p:cNvPr>
+            <p:cNvPicPr>
+              <a:picLocks noChangeAspect="1"/>
+            </p:cNvPicPr>
+            <p:nvPr/>
+          </p:nvPicPr>
+          <p:blipFill>
+            <a:blip r:embed="rId12"/>
+            <a:stretch>
+              <a:fillRect/>
+            </a:stretch>
+          </p:blipFill>
+          <p:spPr>
+            <a:xfrm>
+              <a:off x="-4627194" y="1667067"/>
+              <a:ext cx="2355971" cy="1422473"/>
+            </a:xfrm>
+            <a:prstGeom prst="rect">
+              <a:avLst/>
+            </a:prstGeom>
+          </p:spPr>
+        </p:pic>
+        <p:sp>
+          <p:nvSpPr>
+            <p:cNvPr id="31" name="文本框 30">
+              <a:extLst>
+                <a:ext uri="{FF2B5EF4-FFF2-40B4-BE49-F238E27FC236}">
+                  <a16:creationId xmlns:a16="http://schemas.microsoft.com/office/drawing/2014/main" id="{0523A384-3065-918D-9A14-36E0F147283F}"/>
+                </a:ext>
+              </a:extLst>
+            </p:cNvPr>
+            <p:cNvSpPr txBox="1"/>
+            <p:nvPr/>
+          </p:nvSpPr>
+          <p:spPr>
+            <a:xfrm>
+              <a:off x="-6564329" y="849088"/>
+              <a:ext cx="6159448" cy="523220"/>
+            </a:xfrm>
+            <a:prstGeom prst="rect">
+              <a:avLst/>
+            </a:prstGeom>
+            <a:noFill/>
+          </p:spPr>
+          <p:txBody>
+            <a:bodyPr wrap="square" rtlCol="0">
+              <a:spAutoFit/>
+            </a:bodyPr>
+            <a:lstStyle/>
+            <a:p>
+              <a:pPr algn="ctr"/>
+              <a:r>
+                <a:rPr lang="zh-CN" altLang="en-US" sz="2800" b="1" dirty="0">
+                  <a:solidFill>
+                    <a:schemeClr val="accent6">
+                      <a:lumMod val="60000"/>
+                      <a:lumOff val="40000"/>
+                    </a:schemeClr>
+                  </a:solidFill>
+                </a:rPr>
+                <a:t>材质作用范围</a:t>
+              </a:r>
+              <a:endParaRPr lang="zh-CN" altLang="en-US" dirty="0"/>
+            </a:p>
+          </p:txBody>
+        </p:sp>
+        <p:sp>
+          <p:nvSpPr>
+            <p:cNvPr id="6" name="文本框 5">
+              <a:extLst>
+                <a:ext uri="{FF2B5EF4-FFF2-40B4-BE49-F238E27FC236}">
+                  <a16:creationId xmlns:a16="http://schemas.microsoft.com/office/drawing/2014/main" id="{EE4CEB4F-1ACD-BF8A-0860-CD6F18A045BC}"/>
+                </a:ext>
+              </a:extLst>
+            </p:cNvPr>
+            <p:cNvSpPr txBox="1"/>
+            <p:nvPr/>
+          </p:nvSpPr>
+          <p:spPr>
+            <a:xfrm>
+              <a:off x="-5345615" y="3943689"/>
+              <a:ext cx="5054600" cy="2031325"/>
+            </a:xfrm>
+            <a:prstGeom prst="rect">
+              <a:avLst/>
+            </a:prstGeom>
+            <a:noFill/>
+          </p:spPr>
+          <p:txBody>
+            <a:bodyPr wrap="square" rtlCol="0">
+              <a:spAutoFit/>
+            </a:bodyPr>
+            <a:lstStyle/>
+            <a:p>
+              <a:r>
+                <a:rPr lang="en-US" altLang="zh-CN" dirty="0"/>
+                <a:t>Surface</a:t>
+              </a:r>
+              <a:r>
+                <a:rPr lang="zh-CN" altLang="en-US" dirty="0"/>
+                <a:t>：表面</a:t>
+              </a:r>
+              <a:endParaRPr lang="en-US" altLang="zh-CN" dirty="0"/>
+            </a:p>
+            <a:p>
+              <a:r>
+                <a:rPr lang="en-US" altLang="zh-CN" dirty="0"/>
+                <a:t>Deferred Decal</a:t>
+              </a:r>
+              <a:r>
+                <a:rPr lang="zh-CN" altLang="en-US" dirty="0"/>
+                <a:t>：延迟贴花</a:t>
+              </a:r>
+              <a:endParaRPr lang="en-US" altLang="zh-CN" dirty="0"/>
+            </a:p>
+            <a:p>
+              <a:r>
+                <a:rPr lang="en-US" altLang="zh-CN" dirty="0"/>
+                <a:t>Light Function</a:t>
+              </a:r>
+              <a:r>
+                <a:rPr lang="zh-CN" altLang="en-US" dirty="0"/>
+                <a:t>：灯光函数</a:t>
+              </a:r>
+              <a:endParaRPr lang="en-US" altLang="zh-CN" dirty="0"/>
+            </a:p>
+            <a:p>
+              <a:r>
+                <a:rPr lang="en-US" altLang="zh-CN" dirty="0"/>
+                <a:t>Volume</a:t>
+              </a:r>
+              <a:r>
+                <a:rPr lang="zh-CN" altLang="en-US" dirty="0"/>
+                <a:t>：体积材质</a:t>
+              </a:r>
+              <a:endParaRPr lang="en-US" altLang="zh-CN" dirty="0"/>
+            </a:p>
+            <a:p>
+              <a:r>
+                <a:rPr lang="en-US" altLang="zh-CN" dirty="0"/>
+                <a:t>Post Process</a:t>
+              </a:r>
+              <a:r>
+                <a:rPr lang="zh-CN" altLang="en-US" dirty="0"/>
+                <a:t>：后处理材质</a:t>
+              </a:r>
+              <a:endParaRPr lang="en-US" altLang="zh-CN" dirty="0"/>
+            </a:p>
+            <a:p>
+              <a:r>
+                <a:rPr lang="en-US" altLang="zh-CN" dirty="0"/>
+                <a:t>User Interface</a:t>
+              </a:r>
+              <a:r>
+                <a:rPr lang="zh-CN" altLang="en-US" dirty="0"/>
+                <a:t>：</a:t>
+              </a:r>
+              <a:r>
+                <a:rPr lang="en-US" altLang="zh-CN" dirty="0"/>
+                <a:t>UI</a:t>
+              </a:r>
+              <a:r>
+                <a:rPr lang="zh-CN" altLang="en-US" dirty="0"/>
+                <a:t>材质</a:t>
+              </a:r>
+              <a:endParaRPr lang="en-US" altLang="zh-CN" dirty="0"/>
+            </a:p>
+            <a:p>
+              <a:r>
+                <a:rPr lang="en-US" altLang="zh-CN" dirty="0"/>
+                <a:t>Virtual Texture</a:t>
+              </a:r>
+              <a:r>
+                <a:rPr lang="zh-CN" altLang="en-US" dirty="0"/>
+                <a:t>：用于虚拟材质</a:t>
+              </a:r>
+              <a:r>
+                <a:rPr lang="en-US" altLang="zh-CN" dirty="0"/>
+                <a:t>RVT</a:t>
+              </a:r>
+              <a:endParaRPr lang="zh-CN" altLang="en-US" dirty="0"/>
+            </a:p>
+          </p:txBody>
+        </p:sp>
+      </p:grpSp>
     </p:spTree>
     <p:extLst>
       <p:ext uri="{BB962C8B-B14F-4D97-AF65-F5344CB8AC3E}">
@@ -10465,7 +10312,7 @@
                                         <p:cond delay="0"/>
                                       </p:stCondLst>
                                       <p:childTnLst>
-                                        <p:animMotion origin="layout" path="M 3.33333E-6 1.48148E-6 L 0.67448 1.48148E-6 " pathEditMode="relative" rAng="0" ptsTypes="AA" p14:bounceEnd="51000">
+                                        <p:animMotion origin="layout" path="M -2.08333E-7 -2.96296E-6 L 0.67448 -2.96296E-6 " pathEditMode="relative" rAng="0" ptsTypes="AA" p14:bounceEnd="51000">
                                           <p:cBhvr>
                                             <p:cTn id="10" dur="1000" fill="hold"/>
                                             <p:tgtEl>
@@ -10553,18 +10400,18 @@
                                         <p:cond delay="0"/>
                                       </p:stCondLst>
                                       <p:childTnLst>
-                                        <p:animMotion origin="layout" path="M -0.15625 0 L 0.73112 0 " pathEditMode="relative" rAng="0" ptsTypes="AA" p14:bounceEnd="51000">
+                                        <p:animMotion origin="layout" path="M 3.33333E-6 -2.96296E-6 L 0.67448 -2.96296E-6 " pathEditMode="relative" rAng="0" ptsTypes="AA" p14:bounceEnd="51000">
                                           <p:cBhvr>
                                             <p:cTn id="18" dur="1000" fill="hold"/>
                                             <p:tgtEl>
-                                              <p:spTgt spid="39"/>
+                                              <p:spTgt spid="11"/>
                                             </p:tgtEl>
                                             <p:attrNameLst>
                                               <p:attrName>ppt_x</p:attrName>
                                               <p:attrName>ppt_y</p:attrName>
                                             </p:attrNameLst>
                                           </p:cBhvr>
-                                          <p:rCtr x="44362" y="0"/>
+                                          <p:rCtr x="33724" y="0"/>
                                         </p:animMotion>
                                       </p:childTnLst>
                                     </p:cTn>
@@ -10597,7 +10444,7 @@
                                           <p:cBhvr>
                                             <p:cTn id="22" dur="500"/>
                                             <p:tgtEl>
-                                              <p:spTgt spid="39"/>
+                                              <p:spTgt spid="11"/>
                                             </p:tgtEl>
                                           </p:cBhvr>
                                         </p:animEffect>
@@ -10609,7 +10456,7 @@
                                               </p:stCondLst>
                                             </p:cTn>
                                             <p:tgtEl>
-                                              <p:spTgt spid="39"/>
+                                              <p:spTgt spid="11"/>
                                             </p:tgtEl>
                                             <p:attrNameLst>
                                               <p:attrName>style.visibility</p:attrName>
@@ -10636,7 +10483,7 @@
                                               </p:stCondLst>
                                             </p:cTn>
                                             <p:tgtEl>
-                                              <p:spTgt spid="41"/>
+                                              <p:spTgt spid="39"/>
                                             </p:tgtEl>
                                             <p:attrNameLst>
                                               <p:attrName>style.visibility</p:attrName>
@@ -10650,7 +10497,7 @@
                                           <p:cBhvr>
                                             <p:cTn id="26" dur="500"/>
                                             <p:tgtEl>
-                                              <p:spTgt spid="41"/>
+                                              <p:spTgt spid="39"/>
                                             </p:tgtEl>
                                           </p:cBhvr>
                                         </p:animEffect>
@@ -10676,14 +10523,102 @@
                                 </p:stCondLst>
                                 <p:childTnLst>
                                   <p:par>
-                                    <p:cTn id="29" presetID="16" presetClass="entr" presetSubtype="21" fill="hold" nodeType="clickEffect">
+                                    <p:cTn id="29" presetID="10" presetClass="exit" presetSubtype="0" fill="hold" nodeType="clickEffect">
+                                      <p:stCondLst>
+                                        <p:cond delay="0"/>
+                                      </p:stCondLst>
+                                      <p:childTnLst>
+                                        <p:animEffect transition="out" filter="fade">
+                                          <p:cBhvr>
+                                            <p:cTn id="30" dur="500"/>
+                                            <p:tgtEl>
+                                              <p:spTgt spid="39"/>
+                                            </p:tgtEl>
+                                          </p:cBhvr>
+                                        </p:animEffect>
+                                        <p:set>
+                                          <p:cBhvr>
+                                            <p:cTn id="31" dur="1" fill="hold">
+                                              <p:stCondLst>
+                                                <p:cond delay="499"/>
+                                              </p:stCondLst>
+                                            </p:cTn>
+                                            <p:tgtEl>
+                                              <p:spTgt spid="39"/>
+                                            </p:tgtEl>
+                                            <p:attrNameLst>
+                                              <p:attrName>style.visibility</p:attrName>
+                                            </p:attrNameLst>
+                                          </p:cBhvr>
+                                          <p:to>
+                                            <p:strVal val="hidden"/>
+                                          </p:to>
+                                        </p:set>
+                                      </p:childTnLst>
+                                    </p:cTn>
+                                  </p:par>
+                                  <p:par>
+                                    <p:cTn id="32" presetID="10" presetClass="entr" presetSubtype="0" fill="hold" nodeType="withEffect">
                                       <p:stCondLst>
                                         <p:cond delay="0"/>
                                       </p:stCondLst>
                                       <p:childTnLst>
                                         <p:set>
                                           <p:cBhvr>
-                                            <p:cTn id="30" dur="1" fill="hold">
+                                            <p:cTn id="33" dur="1" fill="hold">
+                                              <p:stCondLst>
+                                                <p:cond delay="0"/>
+                                              </p:stCondLst>
+                                            </p:cTn>
+                                            <p:tgtEl>
+                                              <p:spTgt spid="41"/>
+                                            </p:tgtEl>
+                                            <p:attrNameLst>
+                                              <p:attrName>style.visibility</p:attrName>
+                                            </p:attrNameLst>
+                                          </p:cBhvr>
+                                          <p:to>
+                                            <p:strVal val="visible"/>
+                                          </p:to>
+                                        </p:set>
+                                        <p:animEffect transition="in" filter="fade">
+                                          <p:cBhvr>
+                                            <p:cTn id="34" dur="500"/>
+                                            <p:tgtEl>
+                                              <p:spTgt spid="41"/>
+                                            </p:tgtEl>
+                                          </p:cBhvr>
+                                        </p:animEffect>
+                                      </p:childTnLst>
+                                    </p:cTn>
+                                  </p:par>
+                                </p:childTnLst>
+                              </p:cTn>
+                            </p:par>
+                          </p:childTnLst>
+                        </p:cTn>
+                      </p:par>
+                      <p:par>
+                        <p:cTn id="35" fill="hold">
+                          <p:stCondLst>
+                            <p:cond delay="indefinite"/>
+                          </p:stCondLst>
+                          <p:childTnLst>
+                            <p:par>
+                              <p:cTn id="36" fill="hold">
+                                <p:stCondLst>
+                                  <p:cond delay="0"/>
+                                </p:stCondLst>
+                                <p:childTnLst>
+                                  <p:par>
+                                    <p:cTn id="37" presetID="16" presetClass="entr" presetSubtype="21" fill="hold" nodeType="clickEffect">
+                                      <p:stCondLst>
+                                        <p:cond delay="0"/>
+                                      </p:stCondLst>
+                                      <p:childTnLst>
+                                        <p:set>
+                                          <p:cBhvr>
+                                            <p:cTn id="38" dur="1" fill="hold">
                                               <p:stCondLst>
                                                 <p:cond delay="0"/>
                                               </p:stCondLst>
@@ -10701,7 +10636,7 @@
                                         </p:set>
                                         <p:animEffect transition="in" filter="barn(inVertical)">
                                           <p:cBhvr>
-                                            <p:cTn id="31" dur="500"/>
+                                            <p:cTn id="39" dur="500"/>
                                             <p:tgtEl>
                                               <p:spTgt spid="54"/>
                                             </p:tgtEl>
@@ -10813,7 +10748,7 @@
                                         <p:cond delay="0"/>
                                       </p:stCondLst>
                                       <p:childTnLst>
-                                        <p:animMotion origin="layout" path="M 3.33333E-6 1.48148E-6 L 0.67448 1.48148E-6 " pathEditMode="relative" rAng="0" ptsTypes="AA">
+                                        <p:animMotion origin="layout" path="M -2.08333E-7 -2.96296E-6 L 0.67448 -2.96296E-6 " pathEditMode="relative" rAng="0" ptsTypes="AA">
                                           <p:cBhvr>
                                             <p:cTn id="10" dur="1000" fill="hold"/>
                                             <p:tgtEl>
@@ -10901,18 +10836,18 @@
                                         <p:cond delay="0"/>
                                       </p:stCondLst>
                                       <p:childTnLst>
-                                        <p:animMotion origin="layout" path="M -0.15625 0 L 0.73112 0 " pathEditMode="relative" rAng="0" ptsTypes="AA">
+                                        <p:animMotion origin="layout" path="M 3.33333E-6 -2.96296E-6 L 0.67448 -2.96296E-6 " pathEditMode="relative" rAng="0" ptsTypes="AA">
                                           <p:cBhvr>
                                             <p:cTn id="18" dur="1000" fill="hold"/>
                                             <p:tgtEl>
-                                              <p:spTgt spid="39"/>
+                                              <p:spTgt spid="11"/>
                                             </p:tgtEl>
                                             <p:attrNameLst>
                                               <p:attrName>ppt_x</p:attrName>
                                               <p:attrName>ppt_y</p:attrName>
                                             </p:attrNameLst>
                                           </p:cBhvr>
-                                          <p:rCtr x="44362" y="0"/>
+                                          <p:rCtr x="33724" y="0"/>
                                         </p:animMotion>
                                       </p:childTnLst>
                                     </p:cTn>
@@ -10945,7 +10880,7 @@
                                           <p:cBhvr>
                                             <p:cTn id="22" dur="500"/>
                                             <p:tgtEl>
-                                              <p:spTgt spid="39"/>
+                                              <p:spTgt spid="11"/>
                                             </p:tgtEl>
                                           </p:cBhvr>
                                         </p:animEffect>
@@ -10957,7 +10892,7 @@
                                               </p:stCondLst>
                                             </p:cTn>
                                             <p:tgtEl>
-                                              <p:spTgt spid="39"/>
+                                              <p:spTgt spid="11"/>
                                             </p:tgtEl>
                                             <p:attrNameLst>
                                               <p:attrName>style.visibility</p:attrName>
@@ -10984,7 +10919,7 @@
                                               </p:stCondLst>
                                             </p:cTn>
                                             <p:tgtEl>
-                                              <p:spTgt spid="41"/>
+                                              <p:spTgt spid="39"/>
                                             </p:tgtEl>
                                             <p:attrNameLst>
                                               <p:attrName>style.visibility</p:attrName>
@@ -10998,7 +10933,7 @@
                                           <p:cBhvr>
                                             <p:cTn id="26" dur="500"/>
                                             <p:tgtEl>
-                                              <p:spTgt spid="41"/>
+                                              <p:spTgt spid="39"/>
                                             </p:tgtEl>
                                           </p:cBhvr>
                                         </p:animEffect>
@@ -11024,14 +10959,102 @@
                                 </p:stCondLst>
                                 <p:childTnLst>
                                   <p:par>
-                                    <p:cTn id="29" presetID="16" presetClass="entr" presetSubtype="21" fill="hold" nodeType="clickEffect">
+                                    <p:cTn id="29" presetID="10" presetClass="exit" presetSubtype="0" fill="hold" nodeType="clickEffect">
+                                      <p:stCondLst>
+                                        <p:cond delay="0"/>
+                                      </p:stCondLst>
+                                      <p:childTnLst>
+                                        <p:animEffect transition="out" filter="fade">
+                                          <p:cBhvr>
+                                            <p:cTn id="30" dur="500"/>
+                                            <p:tgtEl>
+                                              <p:spTgt spid="39"/>
+                                            </p:tgtEl>
+                                          </p:cBhvr>
+                                        </p:animEffect>
+                                        <p:set>
+                                          <p:cBhvr>
+                                            <p:cTn id="31" dur="1" fill="hold">
+                                              <p:stCondLst>
+                                                <p:cond delay="499"/>
+                                              </p:stCondLst>
+                                            </p:cTn>
+                                            <p:tgtEl>
+                                              <p:spTgt spid="39"/>
+                                            </p:tgtEl>
+                                            <p:attrNameLst>
+                                              <p:attrName>style.visibility</p:attrName>
+                                            </p:attrNameLst>
+                                          </p:cBhvr>
+                                          <p:to>
+                                            <p:strVal val="hidden"/>
+                                          </p:to>
+                                        </p:set>
+                                      </p:childTnLst>
+                                    </p:cTn>
+                                  </p:par>
+                                  <p:par>
+                                    <p:cTn id="32" presetID="10" presetClass="entr" presetSubtype="0" fill="hold" nodeType="withEffect">
                                       <p:stCondLst>
                                         <p:cond delay="0"/>
                                       </p:stCondLst>
                                       <p:childTnLst>
                                         <p:set>
                                           <p:cBhvr>
-                                            <p:cTn id="30" dur="1" fill="hold">
+                                            <p:cTn id="33" dur="1" fill="hold">
+                                              <p:stCondLst>
+                                                <p:cond delay="0"/>
+                                              </p:stCondLst>
+                                            </p:cTn>
+                                            <p:tgtEl>
+                                              <p:spTgt spid="41"/>
+                                            </p:tgtEl>
+                                            <p:attrNameLst>
+                                              <p:attrName>style.visibility</p:attrName>
+                                            </p:attrNameLst>
+                                          </p:cBhvr>
+                                          <p:to>
+                                            <p:strVal val="visible"/>
+                                          </p:to>
+                                        </p:set>
+                                        <p:animEffect transition="in" filter="fade">
+                                          <p:cBhvr>
+                                            <p:cTn id="34" dur="500"/>
+                                            <p:tgtEl>
+                                              <p:spTgt spid="41"/>
+                                            </p:tgtEl>
+                                          </p:cBhvr>
+                                        </p:animEffect>
+                                      </p:childTnLst>
+                                    </p:cTn>
+                                  </p:par>
+                                </p:childTnLst>
+                              </p:cTn>
+                            </p:par>
+                          </p:childTnLst>
+                        </p:cTn>
+                      </p:par>
+                      <p:par>
+                        <p:cTn id="35" fill="hold">
+                          <p:stCondLst>
+                            <p:cond delay="indefinite"/>
+                          </p:stCondLst>
+                          <p:childTnLst>
+                            <p:par>
+                              <p:cTn id="36" fill="hold">
+                                <p:stCondLst>
+                                  <p:cond delay="0"/>
+                                </p:stCondLst>
+                                <p:childTnLst>
+                                  <p:par>
+                                    <p:cTn id="37" presetID="16" presetClass="entr" presetSubtype="21" fill="hold" nodeType="clickEffect">
+                                      <p:stCondLst>
+                                        <p:cond delay="0"/>
+                                      </p:stCondLst>
+                                      <p:childTnLst>
+                                        <p:set>
+                                          <p:cBhvr>
+                                            <p:cTn id="38" dur="1" fill="hold">
                                               <p:stCondLst>
                                                 <p:cond delay="0"/>
                                               </p:stCondLst>
@@ -11049,7 +11072,7 @@
                                         </p:set>
                                         <p:animEffect transition="in" filter="barn(inVertical)">
                                           <p:cBhvr>
-                                            <p:cTn id="31" dur="500"/>
+                                            <p:cTn id="39" dur="500"/>
                                             <p:tgtEl>
                                               <p:spTgt spid="54"/>
                                             </p:tgtEl>

</xml_diff>